<commit_message>
added source code for presentation
</commit_message>
<xml_diff>
--- a/presentation/behavior_driven_development.pptx
+++ b/presentation/behavior_driven_development.pptx
@@ -285,7 +285,7 @@
               <a:pPr>
                 <a:defRPr/>
               </a:pPr>
-              <a:t>10/13/2014</a:t>
+              <a:t>10/16/2014</a:t>
             </a:fld>
             <a:endParaRPr lang="en-US"/>
           </a:p>
@@ -3881,13 +3881,6 @@
               </a:rPr>
               <a:t>3+4 |  7   |</a:t>
             </a:r>
-            <a:endParaRPr lang="en-US" altLang="en-US" sz="2400" dirty="0">
-              <a:solidFill>
-                <a:srgbClr val="002C78"/>
-              </a:solidFill>
-              <a:latin typeface="Consolas" panose="020B0609020204030204" pitchFamily="49" charset="0"/>
-              <a:cs typeface="Consolas" panose="020B0609020204030204" pitchFamily="49" charset="0"/>
-            </a:endParaRPr>
           </a:p>
         </p:txBody>
       </p:sp>
@@ -4152,11 +4145,7 @@
             </a:r>
             <a:r>
               <a:rPr lang="en-US" dirty="0" smtClean="0"/>
-              <a:t> </a:t>
-            </a:r>
-            <a:r>
-              <a:rPr lang="en-US" dirty="0" smtClean="0"/>
-              <a:t>in practice</a:t>
+              <a:t> in practice</a:t>
             </a:r>
             <a:endParaRPr lang="en-US" dirty="0"/>
           </a:p>
@@ -4351,17 +4340,8 @@
               <a:rPr lang="en-US" sz="1600" dirty="0" smtClean="0">
                 <a:latin typeface="Helvetica LT Std" pitchFamily="34" charset="0"/>
               </a:rPr>
-              <a:t>EPAM Systems — </a:t>
-            </a:r>
-            <a:r>
-              <a:rPr lang="en-US" sz="1600" dirty="0" smtClean="0">
-                <a:latin typeface="Helvetica LT Std" pitchFamily="34" charset="0"/>
-              </a:rPr>
-              <a:t>Behavior Driven Development</a:t>
-            </a:r>
-            <a:endParaRPr lang="en-US" sz="1600" dirty="0" smtClean="0">
-              <a:latin typeface="Helvetica LT Std" pitchFamily="34" charset="0"/>
-            </a:endParaRPr>
+              <a:t>EPAM Systems — Behavior Driven Development</a:t>
+            </a:r>
           </a:p>
           <a:p>
             <a:pPr algn="ctr" eaLnBrk="1" fontAlgn="auto" hangingPunct="1">
@@ -4869,29 +4849,20 @@
               <a:rPr lang="en-US" sz="2600" dirty="0">
                 <a:latin typeface="+mj-lt"/>
               </a:rPr>
-              <a:t> </a:t>
+              <a:t> Behavior-driven development combines the general techniques and principles of TDD with ideas from </a:t>
+            </a:r>
+            <a:r>
+              <a:rPr lang="en-US" sz="2600" b="1" dirty="0">
+                <a:latin typeface="+mj-lt"/>
+              </a:rPr>
+              <a:t>domain-driven design and object-oriented analysis </a:t>
             </a:r>
             <a:r>
               <a:rPr lang="en-US" sz="2600" dirty="0">
                 <a:latin typeface="+mj-lt"/>
               </a:rPr>
-              <a:t>Behavior-driven development combines the general techniques and principles of TDD with ideas from </a:t>
-            </a:r>
-            <a:r>
-              <a:rPr lang="en-US" sz="2600" b="1" dirty="0">
-                <a:latin typeface="+mj-lt"/>
-              </a:rPr>
-              <a:t>domain-driven design and object-oriented analysis </a:t>
-            </a:r>
-            <a:r>
-              <a:rPr lang="en-US" sz="2600" dirty="0">
-                <a:latin typeface="+mj-lt"/>
-              </a:rPr>
               <a:t>and design to provide software development and management teams with shared tools and a shared process to collaborate on software development.</a:t>
             </a:r>
-            <a:endParaRPr lang="en-US" sz="2600" dirty="0">
-              <a:latin typeface="+mj-lt"/>
-            </a:endParaRPr>
           </a:p>
         </p:txBody>
       </p:sp>
@@ -4992,29 +4963,7 @@
                 <a:ea typeface="+mj-ea"/>
                 <a:cs typeface="+mj-cs"/>
               </a:rPr>
-              <a:t>What is </a:t>
-            </a:r>
-            <a:r>
-              <a:rPr lang="en-US" sz="3000" b="1" dirty="0">
-                <a:solidFill>
-                  <a:srgbClr val="21438F"/>
-                </a:solidFill>
-                <a:latin typeface="Helvetica LT Std"/>
-                <a:ea typeface="+mj-ea"/>
-                <a:cs typeface="+mj-cs"/>
-              </a:rPr>
-              <a:t>BDD</a:t>
-            </a:r>
-            <a:r>
-              <a:rPr lang="en-US" sz="3000" b="1" dirty="0">
-                <a:solidFill>
-                  <a:srgbClr val="21438F"/>
-                </a:solidFill>
-                <a:latin typeface="Helvetica LT Std"/>
-                <a:ea typeface="+mj-ea"/>
-                <a:cs typeface="+mj-cs"/>
-              </a:rPr>
-              <a:t>?</a:t>
+              <a:t>What is BDD?</a:t>
             </a:r>
           </a:p>
           <a:p>
@@ -5080,15 +5029,7 @@
             </a:pPr>
             <a:r>
               <a:rPr lang="en-US" dirty="0" smtClean="0"/>
-              <a:t>Uses very specific (and small</a:t>
-            </a:r>
-            <a:r>
-              <a:rPr lang="en-US" dirty="0" smtClean="0"/>
-              <a:t>) common </a:t>
-            </a:r>
-            <a:r>
-              <a:rPr lang="en-US" dirty="0" smtClean="0"/>
-              <a:t>vocabulary to minimize miscommunication</a:t>
+              <a:t>Uses very specific (and small) common vocabulary to minimize miscommunication</a:t>
             </a:r>
           </a:p>
           <a:p>
@@ -5098,11 +5039,7 @@
             </a:pPr>
             <a:r>
               <a:rPr lang="en-US" dirty="0" smtClean="0"/>
-              <a:t>Focuses on the behavioral aspects rather than testing and </a:t>
-            </a:r>
-            <a:r>
-              <a:rPr lang="en-US" dirty="0" smtClean="0"/>
-              <a:t>implementation:</a:t>
+              <a:t>Focuses on the behavioral aspects rather than testing and implementation:</a:t>
             </a:r>
           </a:p>
           <a:p>
@@ -5210,18 +5147,13 @@
           <a:lstStyle/>
           <a:p>
             <a:r>
-              <a:rPr lang="en-US" dirty="0" err="1" smtClean="0"/>
-              <a:t>Behaviour</a:t>
-            </a:r>
-            <a:r>
               <a:rPr lang="en-US" dirty="0" smtClean="0"/>
-              <a:t> </a:t>
+              <a:t>Behavior </a:t>
             </a:r>
             <a:r>
               <a:rPr lang="en-US" dirty="0"/>
               <a:t>Driven Development practices</a:t>
             </a:r>
-            <a:endParaRPr lang="en-US" dirty="0"/>
           </a:p>
         </p:txBody>
       </p:sp>
@@ -5312,12 +5244,12 @@
               <a:t> to describe the </a:t>
             </a:r>
             <a:r>
-              <a:rPr lang="en-US" sz="2600" dirty="0" err="1"/>
-              <a:t>behaviour</a:t>
+              <a:rPr lang="en-US" sz="2600" dirty="0" smtClean="0"/>
+              <a:t>behavior </a:t>
             </a:r>
             <a:r>
               <a:rPr lang="en-US" sz="2600" dirty="0"/>
-              <a:t> of the application, or of units of </a:t>
+              <a:t>of the application, or of units of </a:t>
             </a:r>
             <a:r>
               <a:rPr lang="en-US" sz="2600" dirty="0" smtClean="0"/>
@@ -6835,15 +6767,6 @@
 </file>
 
 <file path=customXml/item2.xml><?xml version="1.0" encoding="utf-8"?>
-<?mso-contentType ?>
-<FormTemplates xmlns="http://schemas.microsoft.com/sharepoint/v3/contenttype/forms">
-  <Display>DocumentLibraryForm</Display>
-  <Edit>DocumentLibraryForm</Edit>
-  <New>DocumentLibraryForm</New>
-</FormTemplates>
-</file>
-
-<file path=customXml/item3.xml><?xml version="1.0" encoding="utf-8"?>
 <ct:contentTypeSchema xmlns:ct="http://schemas.microsoft.com/office/2006/metadata/contentType" xmlns:ma="http://schemas.microsoft.com/office/2006/metadata/properties/metaAttributes" ct:_="" ma:_="" ma:contentTypeName="Document" ma:contentTypeID="0x010100175146E524073F468C4FC57E5B2789C1" ma:contentTypeVersion="0" ma:contentTypeDescription="Create a new document." ma:contentTypeScope="" ma:versionID="2cd562bb1c5679eea0696edea0d34439">
   <xsd:schema xmlns:xsd="http://www.w3.org/2001/XMLSchema" xmlns:p="http://schemas.microsoft.com/office/2006/metadata/properties" targetNamespace="http://schemas.microsoft.com/office/2006/metadata/properties" ma:root="true" ma:fieldsID="4aeb20c0e3442673af7ee10786458764">
     <xsd:element name="properties">
@@ -6892,6 +6815,15 @@
 </ct:contentTypeSchema>
 </file>
 
+<file path=customXml/item3.xml><?xml version="1.0" encoding="utf-8"?>
+<?mso-contentType ?>
+<FormTemplates xmlns="http://schemas.microsoft.com/sharepoint/v3/contenttype/forms">
+  <Display>DocumentLibraryForm</Display>
+  <Edit>DocumentLibraryForm</Edit>
+  <New>DocumentLibraryForm</New>
+</FormTemplates>
+</file>
+
 <file path=customXml/itemProps1.xml><?xml version="1.0" encoding="utf-8"?>
 <ds:datastoreItem xmlns:ds="http://schemas.openxmlformats.org/officeDocument/2006/customXml" ds:itemID="{53EB75D5-C806-4261-A678-C908D537A081}">
   <ds:schemaRefs>
@@ -6908,14 +6840,6 @@
 </file>
 
 <file path=customXml/itemProps2.xml><?xml version="1.0" encoding="utf-8"?>
-<ds:datastoreItem xmlns:ds="http://schemas.openxmlformats.org/officeDocument/2006/customXml" ds:itemID="{AC39EE30-2332-4187-B3E5-769508514A19}">
-  <ds:schemaRefs>
-    <ds:schemaRef ds:uri="http://schemas.microsoft.com/sharepoint/v3/contenttype/forms"/>
-  </ds:schemaRefs>
-</ds:datastoreItem>
-</file>
-
-<file path=customXml/itemProps3.xml><?xml version="1.0" encoding="utf-8"?>
 <ds:datastoreItem xmlns:ds="http://schemas.openxmlformats.org/officeDocument/2006/customXml" ds:itemID="{034CAA0A-5047-4F67-A62F-383038D28FEC}">
   <ds:schemaRefs>
     <ds:schemaRef ds:uri="http://schemas.microsoft.com/office/2006/metadata/contentType"/>
@@ -6928,4 +6852,12 @@
     <ds:schemaRef ds:uri="http://schemas.microsoft.com/office/internal/2005/internalDocumentation"/>
   </ds:schemaRefs>
 </ds:datastoreItem>
+</file>
+
+<file path=customXml/itemProps3.xml><?xml version="1.0" encoding="utf-8"?>
+<ds:datastoreItem xmlns:ds="http://schemas.openxmlformats.org/officeDocument/2006/customXml" ds:itemID="{AC39EE30-2332-4187-B3E5-769508514A19}">
+  <ds:schemaRefs>
+    <ds:schemaRef ds:uri="http://schemas.microsoft.com/sharepoint/v3/contenttype/forms"/>
+  </ds:schemaRefs>
+</ds:datastoreItem>
 </file>
</xml_diff>